<commit_message>
saving ms and ppt changes
</commit_message>
<xml_diff>
--- a/2018-04-02_figure_layout.pptx
+++ b/2018-04-02_figure_layout.pptx
@@ -264,7 +264,7 @@
           <a:p>
             <a:fld id="{8613B011-3E82-E04F-8774-1C022D727498}" type="datetimeFigureOut">
               <a:rPr lang="en-US" smtClean="0"/>
-              <a:t>4/5/18</a:t>
+              <a:t>7/9/18</a:t>
             </a:fld>
             <a:endParaRPr lang="en-US"/>
           </a:p>
@@ -462,7 +462,7 @@
           <a:p>
             <a:fld id="{8613B011-3E82-E04F-8774-1C022D727498}" type="datetimeFigureOut">
               <a:rPr lang="en-US" smtClean="0"/>
-              <a:t>4/5/18</a:t>
+              <a:t>7/9/18</a:t>
             </a:fld>
             <a:endParaRPr lang="en-US"/>
           </a:p>
@@ -670,7 +670,7 @@
           <a:p>
             <a:fld id="{8613B011-3E82-E04F-8774-1C022D727498}" type="datetimeFigureOut">
               <a:rPr lang="en-US" smtClean="0"/>
-              <a:t>4/5/18</a:t>
+              <a:t>7/9/18</a:t>
             </a:fld>
             <a:endParaRPr lang="en-US"/>
           </a:p>
@@ -868,7 +868,7 @@
           <a:p>
             <a:fld id="{8613B011-3E82-E04F-8774-1C022D727498}" type="datetimeFigureOut">
               <a:rPr lang="en-US" smtClean="0"/>
-              <a:t>4/5/18</a:t>
+              <a:t>7/9/18</a:t>
             </a:fld>
             <a:endParaRPr lang="en-US"/>
           </a:p>
@@ -1143,7 +1143,7 @@
           <a:p>
             <a:fld id="{8613B011-3E82-E04F-8774-1C022D727498}" type="datetimeFigureOut">
               <a:rPr lang="en-US" smtClean="0"/>
-              <a:t>4/5/18</a:t>
+              <a:t>7/9/18</a:t>
             </a:fld>
             <a:endParaRPr lang="en-US"/>
           </a:p>
@@ -1408,7 +1408,7 @@
           <a:p>
             <a:fld id="{8613B011-3E82-E04F-8774-1C022D727498}" type="datetimeFigureOut">
               <a:rPr lang="en-US" smtClean="0"/>
-              <a:t>4/5/18</a:t>
+              <a:t>7/9/18</a:t>
             </a:fld>
             <a:endParaRPr lang="en-US"/>
           </a:p>
@@ -1820,7 +1820,7 @@
           <a:p>
             <a:fld id="{8613B011-3E82-E04F-8774-1C022D727498}" type="datetimeFigureOut">
               <a:rPr lang="en-US" smtClean="0"/>
-              <a:t>4/5/18</a:t>
+              <a:t>7/9/18</a:t>
             </a:fld>
             <a:endParaRPr lang="en-US"/>
           </a:p>
@@ -1961,7 +1961,7 @@
           <a:p>
             <a:fld id="{8613B011-3E82-E04F-8774-1C022D727498}" type="datetimeFigureOut">
               <a:rPr lang="en-US" smtClean="0"/>
-              <a:t>4/5/18</a:t>
+              <a:t>7/9/18</a:t>
             </a:fld>
             <a:endParaRPr lang="en-US"/>
           </a:p>
@@ -2074,7 +2074,7 @@
           <a:p>
             <a:fld id="{8613B011-3E82-E04F-8774-1C022D727498}" type="datetimeFigureOut">
               <a:rPr lang="en-US" smtClean="0"/>
-              <a:t>4/5/18</a:t>
+              <a:t>7/9/18</a:t>
             </a:fld>
             <a:endParaRPr lang="en-US"/>
           </a:p>
@@ -2385,7 +2385,7 @@
           <a:p>
             <a:fld id="{8613B011-3E82-E04F-8774-1C022D727498}" type="datetimeFigureOut">
               <a:rPr lang="en-US" smtClean="0"/>
-              <a:t>4/5/18</a:t>
+              <a:t>7/9/18</a:t>
             </a:fld>
             <a:endParaRPr lang="en-US"/>
           </a:p>
@@ -2673,7 +2673,7 @@
           <a:p>
             <a:fld id="{8613B011-3E82-E04F-8774-1C022D727498}" type="datetimeFigureOut">
               <a:rPr lang="en-US" smtClean="0"/>
-              <a:t>4/5/18</a:t>
+              <a:t>7/9/18</a:t>
             </a:fld>
             <a:endParaRPr lang="en-US"/>
           </a:p>
@@ -2914,7 +2914,7 @@
           <a:p>
             <a:fld id="{8613B011-3E82-E04F-8774-1C022D727498}" type="datetimeFigureOut">
               <a:rPr lang="en-US" smtClean="0"/>
-              <a:t>4/5/18</a:t>
+              <a:t>7/9/18</a:t>
             </a:fld>
             <a:endParaRPr lang="en-US"/>
           </a:p>
@@ -3405,7 +3405,7 @@
           <p:nvPr>
             <p:extLst>
               <p:ext uri="{D42A27DB-BD31-4B8C-83A1-F6EECF244321}">
-                <p14:modId xmlns:p14="http://schemas.microsoft.com/office/powerpoint/2010/main" val="3694450671"/>
+                <p14:modId xmlns:p14="http://schemas.microsoft.com/office/powerpoint/2010/main" val="4203361425"/>
               </p:ext>
             </p:extLst>
           </p:nvPr>
@@ -3501,7 +3501,19 @@
                         <a:rPr lang="en-US" sz="1600" u="none" strike="noStrike" dirty="0">
                           <a:effectLst/>
                         </a:rPr>
-                        <a:t>Thermal Hardiness Trade-off (PC2, 22.25%)</a:t>
+                        <a:t>Starvation –desiccation/</a:t>
+                      </a:r>
+                      <a:r>
+                        <a:rPr lang="en-US" sz="1600" u="none" strike="noStrike" dirty="0" err="1">
+                          <a:effectLst/>
+                        </a:rPr>
+                        <a:t>thermeral</a:t>
+                      </a:r>
+                      <a:r>
+                        <a:rPr lang="en-US" sz="1600" u="none" strike="noStrike" dirty="0">
+                          <a:effectLst/>
+                        </a:rPr>
+                        <a:t> tolerance trade off(PC2, 22.25%)</a:t>
                       </a:r>
                       <a:endParaRPr lang="en-US" sz="1600" b="0" i="0" u="none" strike="noStrike" dirty="0">
                         <a:solidFill>
@@ -3597,12 +3609,12 @@
                     <a:p>
                       <a:pPr algn="ctr" fontAlgn="ctr"/>
                       <a:r>
-                        <a:rPr lang="en-US" sz="1600" u="none" strike="noStrike">
+                        <a:rPr lang="en-US" sz="1600" u="none" strike="noStrike" dirty="0">
                           <a:effectLst/>
                         </a:rPr>
                         <a:t>0.34</a:t>
                       </a:r>
-                      <a:endParaRPr lang="en-US" sz="1600" b="0" i="0" u="none" strike="noStrike">
+                      <a:endParaRPr lang="en-US" sz="1600" b="0" i="0" u="none" strike="noStrike" dirty="0">
                         <a:solidFill>
                           <a:srgbClr val="000000"/>
                         </a:solidFill>
@@ -3871,12 +3883,12 @@
                     <a:p>
                       <a:pPr algn="ctr" fontAlgn="ctr"/>
                       <a:r>
-                        <a:rPr lang="en-US" sz="1600" u="none" strike="noStrike">
+                        <a:rPr lang="en-US" sz="1600" u="none" strike="noStrike" dirty="0">
                           <a:effectLst/>
                         </a:rPr>
                         <a:t>-0.23</a:t>
                       </a:r>
-                      <a:endParaRPr lang="en-US" sz="1600" b="0" i="0" u="none" strike="noStrike">
+                      <a:endParaRPr lang="en-US" sz="1600" b="0" i="0" u="none" strike="noStrike" dirty="0">
                         <a:solidFill>
                           <a:srgbClr val="000000"/>
                         </a:solidFill>
@@ -3970,12 +3982,12 @@
                     <a:p>
                       <a:pPr algn="ctr" fontAlgn="ctr"/>
                       <a:r>
-                        <a:rPr lang="en-US" sz="1600" u="none" strike="noStrike">
+                        <a:rPr lang="en-US" sz="1600" u="none" strike="noStrike" dirty="0">
                           <a:effectLst/>
                         </a:rPr>
                         <a:t>0.53</a:t>
                       </a:r>
-                      <a:endParaRPr lang="en-US" sz="1600" b="0" i="0" u="none" strike="noStrike">
+                      <a:endParaRPr lang="en-US" sz="1600" b="0" i="0" u="none" strike="noStrike" dirty="0">
                         <a:solidFill>
                           <a:srgbClr val="000000"/>
                         </a:solidFill>
@@ -6354,6 +6366,127 @@
           </a:prstGeom>
         </p:spPr>
       </p:pic>
+      <p:sp>
+        <p:nvSpPr>
+          <p:cNvPr id="2" name="TextBox 1">
+            <a:extLst>
+              <a:ext uri="{FF2B5EF4-FFF2-40B4-BE49-F238E27FC236}">
+                <a16:creationId xmlns:a16="http://schemas.microsoft.com/office/drawing/2014/main" id="{6F8293C3-7FA0-F246-9776-4FC76E5532CE}"/>
+              </a:ext>
+            </a:extLst>
+          </p:cNvPr>
+          <p:cNvSpPr txBox="1"/>
+          <p:nvPr/>
+        </p:nvSpPr>
+        <p:spPr>
+          <a:xfrm>
+            <a:off x="2260315" y="6041204"/>
+            <a:ext cx="7403693" cy="369332"/>
+          </a:xfrm>
+          <a:prstGeom prst="rect">
+            <a:avLst/>
+          </a:prstGeom>
+          <a:noFill/>
+        </p:spPr>
+        <p:txBody>
+          <a:bodyPr wrap="none" rtlCol="0">
+            <a:spAutoFit/>
+          </a:bodyPr>
+          <a:lstStyle/>
+          <a:p>
+            <a:r>
+              <a:rPr lang="en-US" dirty="0"/>
+              <a:t>Left panel: Low growth and high </a:t>
+            </a:r>
+            <a:r>
+              <a:rPr lang="en-US"/>
+              <a:t>cold tolerance are </a:t>
+            </a:r>
+            <a:r>
+              <a:rPr lang="en-US" dirty="0"/>
+              <a:t>at the edge of the range</a:t>
+            </a:r>
+          </a:p>
+        </p:txBody>
+      </p:sp>
+      <p:sp>
+        <p:nvSpPr>
+          <p:cNvPr id="5" name="TextBox 4">
+            <a:extLst>
+              <a:ext uri="{FF2B5EF4-FFF2-40B4-BE49-F238E27FC236}">
+                <a16:creationId xmlns:a16="http://schemas.microsoft.com/office/drawing/2014/main" id="{7812D937-4EAE-DC46-95A3-84103DC81638}"/>
+              </a:ext>
+            </a:extLst>
+          </p:cNvPr>
+          <p:cNvSpPr txBox="1"/>
+          <p:nvPr/>
+        </p:nvSpPr>
+        <p:spPr>
+          <a:xfrm>
+            <a:off x="2260315" y="6351858"/>
+            <a:ext cx="8213146" cy="369332"/>
+          </a:xfrm>
+          <a:prstGeom prst="rect">
+            <a:avLst/>
+          </a:prstGeom>
+          <a:noFill/>
+        </p:spPr>
+        <p:txBody>
+          <a:bodyPr wrap="none" rtlCol="0">
+            <a:spAutoFit/>
+          </a:bodyPr>
+          <a:lstStyle/>
+          <a:p>
+            <a:r>
+              <a:rPr lang="en-US" dirty="0"/>
+              <a:t>Right panel: High growth and low stress hardiness is associated with lower </a:t>
+            </a:r>
+            <a:r>
+              <a:rPr lang="en-US" dirty="0" err="1"/>
+              <a:t>precitation</a:t>
+            </a:r>
+            <a:r>
+              <a:rPr lang="en-US" dirty="0"/>
+              <a:t> </a:t>
+            </a:r>
+          </a:p>
+        </p:txBody>
+      </p:sp>
+      <p:sp>
+        <p:nvSpPr>
+          <p:cNvPr id="3" name="TextBox 2">
+            <a:extLst>
+              <a:ext uri="{FF2B5EF4-FFF2-40B4-BE49-F238E27FC236}">
+                <a16:creationId xmlns:a16="http://schemas.microsoft.com/office/drawing/2014/main" id="{33C5CA45-AAC1-F445-843C-8A70CA194149}"/>
+              </a:ext>
+            </a:extLst>
+          </p:cNvPr>
+          <p:cNvSpPr txBox="1"/>
+          <p:nvPr/>
+        </p:nvSpPr>
+        <p:spPr>
+          <a:xfrm>
+            <a:off x="102742" y="942208"/>
+            <a:ext cx="9118586" cy="369332"/>
+          </a:xfrm>
+          <a:prstGeom prst="rect">
+            <a:avLst/>
+          </a:prstGeom>
+          <a:noFill/>
+        </p:spPr>
+        <p:txBody>
+          <a:bodyPr wrap="none" rtlCol="0">
+            <a:spAutoFit/>
+          </a:bodyPr>
+          <a:lstStyle/>
+          <a:p>
+            <a:r>
+              <a:rPr lang="en-US" dirty="0"/>
+              <a:t>More cold tolerant, higher growth, lower heat knock down , lower starvation, lower desiccation</a:t>
+            </a:r>
+          </a:p>
+        </p:txBody>
+      </p:sp>
     </p:spTree>
     <p:extLst>
       <p:ext uri="{BB962C8B-B14F-4D97-AF65-F5344CB8AC3E}">
@@ -6439,6 +6572,41 @@
           </a:prstGeom>
         </p:spPr>
       </p:pic>
+      <p:sp>
+        <p:nvSpPr>
+          <p:cNvPr id="6" name="TextBox 5">
+            <a:extLst>
+              <a:ext uri="{FF2B5EF4-FFF2-40B4-BE49-F238E27FC236}">
+                <a16:creationId xmlns:a16="http://schemas.microsoft.com/office/drawing/2014/main" id="{CF72074B-3704-D846-8C79-68D99C26382F}"/>
+              </a:ext>
+            </a:extLst>
+          </p:cNvPr>
+          <p:cNvSpPr txBox="1"/>
+          <p:nvPr/>
+        </p:nvSpPr>
+        <p:spPr>
+          <a:xfrm>
+            <a:off x="4634272" y="1027906"/>
+            <a:ext cx="7601120" cy="369332"/>
+          </a:xfrm>
+          <a:prstGeom prst="rect">
+            <a:avLst/>
+          </a:prstGeom>
+          <a:noFill/>
+        </p:spPr>
+        <p:txBody>
+          <a:bodyPr wrap="none" rtlCol="0">
+            <a:spAutoFit/>
+          </a:bodyPr>
+          <a:lstStyle/>
+          <a:p>
+            <a:r>
+              <a:rPr lang="en-US" dirty="0"/>
+              <a:t>High starvation hardiness and low thermal tolerance, low desiccation hardiness</a:t>
+            </a:r>
+          </a:p>
+        </p:txBody>
+      </p:sp>
     </p:spTree>
     <p:extLst>
       <p:ext uri="{BB962C8B-B14F-4D97-AF65-F5344CB8AC3E}">

</xml_diff>